<commit_message>
Updates the project design
</commit_message>
<xml_diff>
--- a/Project_Design/Project Design.pptx
+++ b/Project_Design/Project Design.pptx
@@ -3660,6 +3660,64 @@
           </a:p>
         </p:txBody>
       </p:sp>
+      <p:sp>
+        <p:nvSpPr>
+          <p:cNvPr id="2" name="Text Box 1"/>
+          <p:cNvSpPr txBox="1"/>
+          <p:nvPr/>
+        </p:nvSpPr>
+        <p:spPr>
+          <a:xfrm>
+            <a:off x="963295" y="1977390"/>
+            <a:ext cx="2240915" cy="583565"/>
+          </a:xfrm>
+          <a:prstGeom prst="rect">
+            <a:avLst/>
+          </a:prstGeom>
+          <a:noFill/>
+        </p:spPr>
+        <p:txBody>
+          <a:bodyPr wrap="square" rtlCol="0">
+            <a:spAutoFit/>
+          </a:bodyPr>
+          <a:p>
+            <a:r>
+              <a:rPr lang="en-US" sz="1600"/>
+              <a:t>GET response to request for the Forcast</a:t>
+            </a:r>
+            <a:endParaRPr lang="en-US" sz="1600"/>
+          </a:p>
+        </p:txBody>
+      </p:sp>
+      <p:sp>
+        <p:nvSpPr>
+          <p:cNvPr id="3" name="Text Box 2"/>
+          <p:cNvSpPr txBox="1"/>
+          <p:nvPr/>
+        </p:nvSpPr>
+        <p:spPr>
+          <a:xfrm>
+            <a:off x="1031875" y="3741420"/>
+            <a:ext cx="2026285" cy="583565"/>
+          </a:xfrm>
+          <a:prstGeom prst="rect">
+            <a:avLst/>
+          </a:prstGeom>
+          <a:noFill/>
+        </p:spPr>
+        <p:txBody>
+          <a:bodyPr wrap="square" rtlCol="0">
+            <a:spAutoFit/>
+          </a:bodyPr>
+          <a:p>
+            <a:r>
+              <a:rPr lang="en-US" sz="1600"/>
+              <a:t>POST /PUT response with the Forcast</a:t>
+            </a:r>
+            <a:endParaRPr lang="en-US" sz="1600"/>
+          </a:p>
+        </p:txBody>
+      </p:sp>
     </p:spTree>
   </p:cSld>
   <p:clrMapOvr>

</xml_diff>

<commit_message>
Updates the project design on the client side
</commit_message>
<xml_diff>
--- a/Project_Design/Project Design.pptx
+++ b/Project_Design/Project Design.pptx
@@ -3683,7 +3683,7 @@
           <a:p>
             <a:r>
               <a:rPr lang="en-US" sz="1600"/>
-              <a:t>GET response to request for the Forcast</a:t>
+              <a:t>GET response to request for the Forcast </a:t>
             </a:r>
             <a:endParaRPr lang="en-US" sz="1600"/>
           </a:p>
@@ -3718,6 +3718,187 @@
           </a:p>
         </p:txBody>
       </p:sp>
+      <p:cxnSp>
+        <p:nvCxnSpPr>
+          <p:cNvPr id="4" name="Straight Arrow Connector 3"/>
+          <p:cNvCxnSpPr/>
+          <p:nvPr/>
+        </p:nvCxnSpPr>
+        <p:spPr>
+          <a:xfrm flipH="1">
+            <a:off x="1744345" y="1482090"/>
+            <a:ext cx="1905" cy="507365"/>
+          </a:xfrm>
+          <a:prstGeom prst="straightConnector1">
+            <a:avLst/>
+          </a:prstGeom>
+          <a:ln>
+            <a:tailEnd type="arrow" w="med" len="med"/>
+          </a:ln>
+        </p:spPr>
+        <p:style>
+          <a:lnRef idx="3">
+            <a:schemeClr val="accent1"/>
+          </a:lnRef>
+          <a:fillRef idx="0">
+            <a:srgbClr val="FFFFFF"/>
+          </a:fillRef>
+          <a:effectRef idx="0">
+            <a:srgbClr val="FFFFFF"/>
+          </a:effectRef>
+          <a:fontRef idx="minor">
+            <a:schemeClr val="tx1"/>
+          </a:fontRef>
+        </p:style>
+      </p:cxnSp>
+      <p:sp>
+        <p:nvSpPr>
+          <p:cNvPr id="5" name="Text Box 4"/>
+          <p:cNvSpPr txBox="1"/>
+          <p:nvPr/>
+        </p:nvSpPr>
+        <p:spPr>
+          <a:xfrm>
+            <a:off x="924560" y="408940"/>
+            <a:ext cx="3164840" cy="1092835"/>
+          </a:xfrm>
+          <a:prstGeom prst="rect">
+            <a:avLst/>
+          </a:prstGeom>
+          <a:noFill/>
+        </p:spPr>
+        <p:txBody>
+          <a:bodyPr wrap="square" rtlCol="0">
+            <a:noAutofit/>
+          </a:bodyPr>
+          <a:p>
+            <a:r>
+              <a:rPr lang="en-US" sz="1600"/>
+              <a:t>HTML,CSS Template to </a:t>
+            </a:r>
+            <a:endParaRPr lang="en-US" sz="1600"/>
+          </a:p>
+          <a:p>
+            <a:r>
+              <a:rPr lang="en-US" sz="1600"/>
+              <a:t>Selection Metric  : </a:t>
+            </a:r>
+            <a:endParaRPr lang="en-US" sz="1600"/>
+          </a:p>
+          <a:p>
+            <a:r>
+              <a:rPr lang="en-US" sz="1600"/>
+              <a:t>Date: Start Date : END </a:t>
+            </a:r>
+            <a:r>
+              <a:rPr lang="en-US" sz="1600">
+                <a:sym typeface="+mn-ea"/>
+              </a:rPr>
+              <a:t> Date</a:t>
+            </a:r>
+            <a:endParaRPr lang="en-US" sz="1600">
+              <a:sym typeface="+mn-ea"/>
+            </a:endParaRPr>
+          </a:p>
+          <a:p>
+            <a:r>
+              <a:rPr lang="en-US" sz="1600">
+                <a:sym typeface="+mn-ea"/>
+              </a:rPr>
+              <a:t>Time Frame :6,12,24 </a:t>
+            </a:r>
+            <a:endParaRPr lang="en-US" sz="1600">
+              <a:sym typeface="+mn-ea"/>
+            </a:endParaRPr>
+          </a:p>
+          <a:p>
+            <a:endParaRPr lang="en-US" sz="1600"/>
+          </a:p>
+        </p:txBody>
+      </p:sp>
+      <p:sp>
+        <p:nvSpPr>
+          <p:cNvPr id="6" name="Text Box 5"/>
+          <p:cNvSpPr txBox="1"/>
+          <p:nvPr/>
+        </p:nvSpPr>
+        <p:spPr>
+          <a:xfrm>
+            <a:off x="963295" y="4801870"/>
+            <a:ext cx="3164840" cy="1591945"/>
+          </a:xfrm>
+          <a:prstGeom prst="rect">
+            <a:avLst/>
+          </a:prstGeom>
+          <a:noFill/>
+        </p:spPr>
+        <p:txBody>
+          <a:bodyPr wrap="square" rtlCol="0">
+            <a:noAutofit/>
+          </a:bodyPr>
+          <a:p>
+            <a:r>
+              <a:rPr lang="en-US" sz="1600"/>
+              <a:t>HTML,CSS Template which display the Forcast</a:t>
+            </a:r>
+            <a:endParaRPr lang="en-US" sz="1600"/>
+          </a:p>
+          <a:p>
+            <a:r>
+              <a:rPr lang="en-US" sz="1600"/>
+              <a:t>POST ==&gt; When we need a new forcast </a:t>
+            </a:r>
+            <a:endParaRPr lang="en-US" sz="1600"/>
+          </a:p>
+          <a:p>
+            <a:r>
+              <a:rPr lang="en-US" sz="1600">
+                <a:sym typeface="+mn-ea"/>
+              </a:rPr>
+              <a:t>PUT ==&gt; When we need to update the Existing forcast</a:t>
+            </a:r>
+            <a:endParaRPr lang="en-US" sz="1600">
+              <a:sym typeface="+mn-ea"/>
+            </a:endParaRPr>
+          </a:p>
+          <a:p>
+            <a:endParaRPr lang="en-US" sz="1600"/>
+          </a:p>
+        </p:txBody>
+      </p:sp>
+      <p:cxnSp>
+        <p:nvCxnSpPr>
+          <p:cNvPr id="7" name="Straight Arrow Connector 6"/>
+          <p:cNvCxnSpPr/>
+          <p:nvPr/>
+        </p:nvCxnSpPr>
+        <p:spPr>
+          <a:xfrm flipH="1" flipV="1">
+            <a:off x="1781810" y="4264025"/>
+            <a:ext cx="5080" cy="565150"/>
+          </a:xfrm>
+          <a:prstGeom prst="straightConnector1">
+            <a:avLst/>
+          </a:prstGeom>
+          <a:ln>
+            <a:tailEnd type="arrow" w="med" len="med"/>
+          </a:ln>
+        </p:spPr>
+        <p:style>
+          <a:lnRef idx="3">
+            <a:schemeClr val="accent1"/>
+          </a:lnRef>
+          <a:fillRef idx="0">
+            <a:srgbClr val="FFFFFF"/>
+          </a:fillRef>
+          <a:effectRef idx="0">
+            <a:srgbClr val="FFFFFF"/>
+          </a:effectRef>
+          <a:fontRef idx="minor">
+            <a:schemeClr val="tx1"/>
+          </a:fontRef>
+        </p:style>
+      </p:cxnSp>
     </p:spTree>
   </p:cSld>
   <p:clrMapOvr>

</xml_diff>